<commit_message>
se sube actualizacion de plantilla word y plantilla point
</commit_message>
<xml_diff>
--- a/proyecto_formativo/documentacion/1er_trimestre/1_Presentación_Sustentacion.pptx
+++ b/proyecto_formativo/documentacion/1er_trimestre/1_Presentación_Sustentacion.pptx
@@ -310,7 +310,7 @@
           <a:p>
             <a:fld id="{B3030C24-9424-B24A-8613-79990C3AA492}" type="datetimeFigureOut">
               <a:rPr lang="es-ES" smtClean="0"/>
-              <a:t>29/03/2021</a:t>
+              <a:t>31/03/2021</a:t>
             </a:fld>
             <a:endParaRPr lang="es-ES"/>
           </a:p>
@@ -490,7 +490,7 @@
           <a:p>
             <a:fld id="{B3030C24-9424-B24A-8613-79990C3AA492}" type="datetimeFigureOut">
               <a:rPr lang="es-ES" smtClean="0"/>
-              <a:t>29/03/2021</a:t>
+              <a:t>31/03/2021</a:t>
             </a:fld>
             <a:endParaRPr lang="es-ES"/>
           </a:p>
@@ -1127,7 +1127,7 @@
           <a:p>
             <a:fld id="{B3030C24-9424-B24A-8613-79990C3AA492}" type="datetimeFigureOut">
               <a:rPr lang="es-ES" smtClean="0"/>
-              <a:t>29/03/2021</a:t>
+              <a:t>31/03/2021</a:t>
             </a:fld>
             <a:endParaRPr lang="es-ES"/>
           </a:p>
@@ -1380,7 +1380,7 @@
           <a:p>
             <a:fld id="{B3030C24-9424-B24A-8613-79990C3AA492}" type="datetimeFigureOut">
               <a:rPr lang="es-ES" smtClean="0"/>
-              <a:t>29/03/2021</a:t>
+              <a:t>31/03/2021</a:t>
             </a:fld>
             <a:endParaRPr lang="es-ES"/>
           </a:p>
@@ -1593,7 +1593,7 @@
           <a:p>
             <a:fld id="{B3030C24-9424-B24A-8613-79990C3AA492}" type="datetimeFigureOut">
               <a:rPr lang="es-ES" smtClean="0"/>
-              <a:t>29/03/2021</a:t>
+              <a:t>31/03/2021</a:t>
             </a:fld>
             <a:endParaRPr lang="es-ES"/>
           </a:p>
@@ -7455,7 +7455,7 @@
         <p:spPr>
           <a:xfrm>
             <a:off x="117054" y="1122443"/>
-            <a:ext cx="5496937" cy="4031873"/>
+            <a:ext cx="5496937" cy="4278094"/>
           </a:xfrm>
           <a:prstGeom prst="rect">
             <a:avLst/>
@@ -7539,29 +7539,7 @@
                   </a:schemeClr>
                 </a:solidFill>
               </a:rPr>
-              <a:t>Gestionar el manejo de inventarios, con posibilidad de consultar, editar o eliminar, así </a:t>
-            </a:r>
-            <a:r>
-              <a:rPr lang="es-ES" sz="1600" u="sng" dirty="0">
-                <a:solidFill>
-                  <a:schemeClr val="tx1">
-                    <a:lumMod val="75000"/>
-                    <a:lumOff val="25000"/>
-                  </a:schemeClr>
-                </a:solidFill>
-              </a:rPr>
-              <a:t>como</a:t>
-            </a:r>
-            <a:r>
-              <a:rPr lang="es-ES" sz="1600" dirty="0">
-                <a:solidFill>
-                  <a:schemeClr val="tx1">
-                    <a:lumMod val="75000"/>
-                    <a:lumOff val="25000"/>
-                  </a:schemeClr>
-                </a:solidFill>
-              </a:rPr>
-              <a:t> añadir un nuevo inventario para la empresa LES asesores contables.</a:t>
+              <a:t>Gestionar el manejo de inventarios, con posibilidad de consultar, editar cambiar de estado o eliminar, así como añadir un nuevo inventario para la empresa LES asesores contables.</a:t>
             </a:r>
           </a:p>
           <a:p>

</xml_diff>